<commit_message>
Added about computers categories
</commit_message>
<xml_diff>
--- a/Intro.pptx
+++ b/Intro.pptx
@@ -5,7 +5,8 @@
     <p:sldMasterId id="2147483648" r:id="rId1"/>
   </p:sldMasterIdLst>
   <p:sldIdLst>
-    <p:sldId id="256" r:id="rId2"/>
+    <p:sldId id="257" r:id="rId2"/>
+    <p:sldId id="258" r:id="rId3"/>
   </p:sldIdLst>
   <p:sldSz cx="12192000" cy="6858000"/>
   <p:notesSz cx="6858000" cy="9144000"/>
@@ -3022,6 +3023,9 @@
           <a:prstGeom prst="ellipse">
             <a:avLst/>
           </a:prstGeom>
+          <a:solidFill>
+            <a:srgbClr val="FFC000"/>
+          </a:solidFill>
         </p:spPr>
         <p:style>
           <a:lnRef idx="2">
@@ -3046,7 +3050,7 @@
             <a:pPr algn="ctr"/>
             <a:r>
               <a:rPr lang="en-US" dirty="0" smtClean="0"/>
-              <a:t>Computer Abstraction</a:t>
+              <a:t>1.Computer Abstraction</a:t>
             </a:r>
             <a:endParaRPr lang="en-US" dirty="0"/>
           </a:p>
@@ -3066,6 +3070,9 @@
           <a:prstGeom prst="ellipse">
             <a:avLst/>
           </a:prstGeom>
+          <a:solidFill>
+            <a:srgbClr val="00B0F0"/>
+          </a:solidFill>
         </p:spPr>
         <p:style>
           <a:lnRef idx="2">
@@ -3087,9 +3094,14 @@
           <a:bodyPr rtlCol="0" anchor="ctr"/>
           <a:lstStyle/>
           <a:p>
+            <a:pPr algn="ctr"/>
+            <a:r>
+              <a:rPr lang="en-US" dirty="0" smtClean="0"/>
+              <a:t>2.Arithmetic </a:t>
+            </a:r>
             <a:r>
               <a:rPr lang="en-US" dirty="0"/>
-              <a:t>Arithmetic for Computers</a:t>
+              <a:t>for Computers</a:t>
             </a:r>
           </a:p>
         </p:txBody>
@@ -3108,6 +3120,9 @@
           <a:prstGeom prst="ellipse">
             <a:avLst/>
           </a:prstGeom>
+          <a:solidFill>
+            <a:srgbClr val="7030A0"/>
+          </a:solidFill>
         </p:spPr>
         <p:style>
           <a:lnRef idx="2">
@@ -3131,8 +3146,12 @@
           <a:p>
             <a:pPr algn="ctr"/>
             <a:r>
+              <a:rPr lang="en-US" dirty="0" smtClean="0"/>
+              <a:t>3.Language </a:t>
+            </a:r>
+            <a:r>
               <a:rPr lang="en-US" dirty="0"/>
-              <a:t>Language of the computer</a:t>
+              <a:t>of the computer</a:t>
             </a:r>
           </a:p>
         </p:txBody>
@@ -3151,6 +3170,14 @@
           <a:prstGeom prst="ellipse">
             <a:avLst/>
           </a:prstGeom>
+          <a:solidFill>
+            <a:srgbClr val="00B050"/>
+          </a:solidFill>
+          <a:ln>
+            <a:solidFill>
+              <a:srgbClr val="00B050"/>
+            </a:solidFill>
+          </a:ln>
         </p:spPr>
         <p:style>
           <a:lnRef idx="2">
@@ -3175,7 +3202,7 @@
             <a:pPr algn="ctr"/>
             <a:r>
               <a:rPr lang="en-US" dirty="0" smtClean="0"/>
-              <a:t>Memory Hierarchy</a:t>
+              <a:t>4.Memory Hierarchy</a:t>
             </a:r>
             <a:endParaRPr lang="en-US" dirty="0"/>
           </a:p>
@@ -3195,6 +3222,11 @@
           <a:prstGeom prst="ellipse">
             <a:avLst/>
           </a:prstGeom>
+          <a:solidFill>
+            <a:schemeClr val="accent5">
+              <a:lumMod val="75000"/>
+            </a:schemeClr>
+          </a:solidFill>
         </p:spPr>
         <p:style>
           <a:lnRef idx="2">
@@ -3219,7 +3251,7 @@
             <a:pPr algn="ctr"/>
             <a:r>
               <a:rPr lang="en-US" dirty="0" smtClean="0"/>
-              <a:t>The Processor</a:t>
+              <a:t>5.The Processor</a:t>
             </a:r>
             <a:endParaRPr lang="en-US" dirty="0"/>
           </a:p>
@@ -3239,6 +3271,9 @@
           <a:prstGeom prst="ellipse">
             <a:avLst/>
           </a:prstGeom>
+          <a:solidFill>
+            <a:srgbClr val="C00000"/>
+          </a:solidFill>
         </p:spPr>
         <p:style>
           <a:lnRef idx="2">
@@ -3263,7 +3298,7 @@
             <a:pPr algn="ctr"/>
             <a:r>
               <a:rPr lang="en-US" dirty="0" smtClean="0"/>
-              <a:t>Pipelining</a:t>
+              <a:t>6.Pipelining</a:t>
             </a:r>
             <a:endParaRPr lang="en-US" dirty="0"/>
           </a:p>
@@ -3283,6 +3318,11 @@
           <a:prstGeom prst="ellipse">
             <a:avLst/>
           </a:prstGeom>
+          <a:solidFill>
+            <a:schemeClr val="accent6">
+              <a:lumMod val="50000"/>
+            </a:schemeClr>
+          </a:solidFill>
         </p:spPr>
         <p:style>
           <a:lnRef idx="2">
@@ -3307,7 +3347,7 @@
             <a:pPr algn="ctr"/>
             <a:r>
               <a:rPr lang="en-US" dirty="0" smtClean="0"/>
-              <a:t>Instruction Set Architecture</a:t>
+              <a:t>7.Instruction Set Architecture</a:t>
             </a:r>
             <a:endParaRPr lang="en-US" dirty="0"/>
           </a:p>
@@ -3327,6 +3367,9 @@
           <a:prstGeom prst="ellipse">
             <a:avLst/>
           </a:prstGeom>
+          <a:solidFill>
+            <a:srgbClr val="55DB88"/>
+          </a:solidFill>
         </p:spPr>
         <p:style>
           <a:lnRef idx="2">
@@ -3351,7 +3394,7 @@
             <a:pPr algn="ctr"/>
             <a:r>
               <a:rPr lang="en-US" dirty="0" smtClean="0"/>
-              <a:t>Input Output Devices</a:t>
+              <a:t>8.Input Output Devices</a:t>
             </a:r>
             <a:endParaRPr lang="en-US" dirty="0"/>
           </a:p>
@@ -3360,7 +3403,695 @@
     </p:spTree>
     <p:extLst>
       <p:ext uri="{BB962C8B-B14F-4D97-AF65-F5344CB8AC3E}">
-        <p14:creationId xmlns:p14="http://schemas.microsoft.com/office/powerpoint/2010/main" val="1815373849"/>
+        <p14:creationId xmlns:p14="http://schemas.microsoft.com/office/powerpoint/2010/main" val="3633257739"/>
+      </p:ext>
+    </p:extLst>
+  </p:cSld>
+  <p:clrMapOvr>
+    <a:masterClrMapping/>
+  </p:clrMapOvr>
+</p:sld>
+</file>
+
+<file path=ppt/slides/slide2.xml><?xml version="1.0" encoding="utf-8"?>
+<p:sld xmlns:a="http://schemas.openxmlformats.org/drawingml/2006/main" xmlns:r="http://schemas.openxmlformats.org/officeDocument/2006/relationships" xmlns:p="http://schemas.openxmlformats.org/presentationml/2006/main">
+  <p:cSld>
+    <p:spTree>
+      <p:nvGrpSpPr>
+        <p:cNvPr id="1" name=""/>
+        <p:cNvGrpSpPr/>
+        <p:nvPr/>
+      </p:nvGrpSpPr>
+      <p:grpSpPr>
+        <a:xfrm>
+          <a:off x="0" y="0"/>
+          <a:ext cx="0" cy="0"/>
+          <a:chOff x="0" y="0"/>
+          <a:chExt cx="0" cy="0"/>
+        </a:xfrm>
+      </p:grpSpPr>
+      <p:sp>
+        <p:nvSpPr>
+          <p:cNvPr id="4" name="Rounded Rectangle 3"/>
+          <p:cNvSpPr/>
+          <p:nvPr/>
+        </p:nvSpPr>
+        <p:spPr>
+          <a:xfrm>
+            <a:off x="3891886" y="2838735"/>
+            <a:ext cx="3329453" cy="701046"/>
+          </a:xfrm>
+          <a:prstGeom prst="roundRect">
+            <a:avLst/>
+          </a:prstGeom>
+        </p:spPr>
+        <p:style>
+          <a:lnRef idx="2">
+            <a:schemeClr val="accent1">
+              <a:shade val="50000"/>
+            </a:schemeClr>
+          </a:lnRef>
+          <a:fillRef idx="1">
+            <a:schemeClr val="accent1"/>
+          </a:fillRef>
+          <a:effectRef idx="0">
+            <a:schemeClr val="accent1"/>
+          </a:effectRef>
+          <a:fontRef idx="minor">
+            <a:schemeClr val="lt1"/>
+          </a:fontRef>
+        </p:style>
+        <p:txBody>
+          <a:bodyPr rtlCol="0" anchor="ctr"/>
+          <a:lstStyle/>
+          <a:p>
+            <a:pPr algn="ctr"/>
+            <a:r>
+              <a:rPr lang="en-US" sz="3200" dirty="0" smtClean="0"/>
+              <a:t>Computers</a:t>
+            </a:r>
+            <a:endParaRPr lang="en-US" sz="3200" dirty="0"/>
+          </a:p>
+        </p:txBody>
+      </p:sp>
+      <p:sp>
+        <p:nvSpPr>
+          <p:cNvPr id="5" name="Oval 4"/>
+          <p:cNvSpPr/>
+          <p:nvPr/>
+        </p:nvSpPr>
+        <p:spPr>
+          <a:xfrm>
+            <a:off x="3316406" y="218364"/>
+            <a:ext cx="3029803" cy="1377287"/>
+          </a:xfrm>
+          <a:prstGeom prst="ellipse">
+            <a:avLst/>
+          </a:prstGeom>
+          <a:solidFill>
+            <a:srgbClr val="FFC000"/>
+          </a:solidFill>
+        </p:spPr>
+        <p:style>
+          <a:lnRef idx="2">
+            <a:schemeClr val="accent1">
+              <a:shade val="50000"/>
+            </a:schemeClr>
+          </a:lnRef>
+          <a:fillRef idx="1">
+            <a:schemeClr val="accent1"/>
+          </a:fillRef>
+          <a:effectRef idx="0">
+            <a:schemeClr val="accent1"/>
+          </a:effectRef>
+          <a:fontRef idx="minor">
+            <a:schemeClr val="lt1"/>
+          </a:fontRef>
+        </p:style>
+        <p:txBody>
+          <a:bodyPr rtlCol="0" anchor="ctr"/>
+          <a:lstStyle/>
+          <a:p>
+            <a:pPr algn="ctr"/>
+            <a:r>
+              <a:rPr lang="en-US" sz="2400" dirty="0"/>
+              <a:t>designed for use by an individual</a:t>
+            </a:r>
+          </a:p>
+        </p:txBody>
+      </p:sp>
+      <p:sp>
+        <p:nvSpPr>
+          <p:cNvPr id="6" name="Oval 5"/>
+          <p:cNvSpPr/>
+          <p:nvPr/>
+        </p:nvSpPr>
+        <p:spPr>
+          <a:xfrm>
+            <a:off x="7303827" y="0"/>
+            <a:ext cx="4214883" cy="1710363"/>
+          </a:xfrm>
+          <a:prstGeom prst="ellipse">
+            <a:avLst/>
+          </a:prstGeom>
+          <a:solidFill>
+            <a:srgbClr val="00B0F0"/>
+          </a:solidFill>
+        </p:spPr>
+        <p:style>
+          <a:lnRef idx="2">
+            <a:schemeClr val="accent1">
+              <a:shade val="50000"/>
+            </a:schemeClr>
+          </a:lnRef>
+          <a:fillRef idx="1">
+            <a:schemeClr val="accent1"/>
+          </a:fillRef>
+          <a:effectRef idx="0">
+            <a:schemeClr val="accent1"/>
+          </a:effectRef>
+          <a:fontRef idx="minor">
+            <a:schemeClr val="lt1"/>
+          </a:fontRef>
+        </p:style>
+        <p:txBody>
+          <a:bodyPr rtlCol="0" anchor="ctr"/>
+          <a:lstStyle/>
+          <a:p>
+            <a:pPr algn="ctr"/>
+            <a:r>
+              <a:rPr lang="en-US" dirty="0" smtClean="0"/>
+              <a:t>Running </a:t>
+            </a:r>
+            <a:r>
+              <a:rPr lang="en-US" dirty="0"/>
+              <a:t>larger programs</a:t>
+            </a:r>
+          </a:p>
+          <a:p>
+            <a:pPr algn="ctr"/>
+            <a:r>
+              <a:rPr lang="en-US" dirty="0"/>
+              <a:t>for multiple users, often simultaneously, and</a:t>
+            </a:r>
+          </a:p>
+          <a:p>
+            <a:pPr algn="ctr"/>
+            <a:r>
+              <a:rPr lang="en-US" dirty="0"/>
+              <a:t>typically accessed only via a network.</a:t>
+            </a:r>
+          </a:p>
+        </p:txBody>
+      </p:sp>
+      <p:sp>
+        <p:nvSpPr>
+          <p:cNvPr id="7" name="Oval 6"/>
+          <p:cNvSpPr/>
+          <p:nvPr/>
+        </p:nvSpPr>
+        <p:spPr>
+          <a:xfrm>
+            <a:off x="8746722" y="1988024"/>
+            <a:ext cx="3029803" cy="2763671"/>
+          </a:xfrm>
+          <a:prstGeom prst="ellipse">
+            <a:avLst/>
+          </a:prstGeom>
+          <a:solidFill>
+            <a:srgbClr val="7030A0"/>
+          </a:solidFill>
+        </p:spPr>
+        <p:style>
+          <a:lnRef idx="2">
+            <a:schemeClr val="accent1">
+              <a:shade val="50000"/>
+            </a:schemeClr>
+          </a:lnRef>
+          <a:fillRef idx="1">
+            <a:schemeClr val="accent1"/>
+          </a:fillRef>
+          <a:effectRef idx="0">
+            <a:schemeClr val="accent1"/>
+          </a:effectRef>
+          <a:fontRef idx="minor">
+            <a:schemeClr val="lt1"/>
+          </a:fontRef>
+        </p:style>
+        <p:txBody>
+          <a:bodyPr rtlCol="0" anchor="ctr"/>
+          <a:lstStyle/>
+          <a:p>
+            <a:r>
+              <a:rPr lang="en-US" dirty="0"/>
+              <a:t>A class of computers with the highest</a:t>
+            </a:r>
+          </a:p>
+          <a:p>
+            <a:r>
+              <a:rPr lang="en-US" dirty="0"/>
+              <a:t>performance and cost; they are configured as</a:t>
+            </a:r>
+          </a:p>
+          <a:p>
+            <a:r>
+              <a:rPr lang="en-US" dirty="0"/>
+              <a:t>servers and typically cost millions of dollars.</a:t>
+            </a:r>
+          </a:p>
+        </p:txBody>
+      </p:sp>
+      <p:sp>
+        <p:nvSpPr>
+          <p:cNvPr id="8" name="Oval 7"/>
+          <p:cNvSpPr/>
+          <p:nvPr/>
+        </p:nvSpPr>
+        <p:spPr>
+          <a:xfrm>
+            <a:off x="4772883" y="4800324"/>
+            <a:ext cx="3755736" cy="1819594"/>
+          </a:xfrm>
+          <a:prstGeom prst="ellipse">
+            <a:avLst/>
+          </a:prstGeom>
+          <a:solidFill>
+            <a:srgbClr val="00B050"/>
+          </a:solidFill>
+          <a:ln>
+            <a:solidFill>
+              <a:srgbClr val="00B050"/>
+            </a:solidFill>
+          </a:ln>
+        </p:spPr>
+        <p:style>
+          <a:lnRef idx="2">
+            <a:schemeClr val="accent1">
+              <a:shade val="50000"/>
+            </a:schemeClr>
+          </a:lnRef>
+          <a:fillRef idx="1">
+            <a:schemeClr val="accent1"/>
+          </a:fillRef>
+          <a:effectRef idx="0">
+            <a:schemeClr val="accent1"/>
+          </a:effectRef>
+          <a:fontRef idx="minor">
+            <a:schemeClr val="lt1"/>
+          </a:fontRef>
+        </p:style>
+        <p:txBody>
+          <a:bodyPr rtlCol="0" anchor="ctr"/>
+          <a:lstStyle/>
+          <a:p>
+            <a:r>
+              <a:rPr lang="en-US" dirty="0"/>
+              <a:t>A room or building designed to handle the</a:t>
+            </a:r>
+          </a:p>
+          <a:p>
+            <a:r>
+              <a:rPr lang="en-US" dirty="0"/>
+              <a:t>power, cooling, and networking needs of a</a:t>
+            </a:r>
+          </a:p>
+          <a:p>
+            <a:r>
+              <a:rPr lang="en-US" dirty="0"/>
+              <a:t>large number of servers.</a:t>
+            </a:r>
+          </a:p>
+        </p:txBody>
+      </p:sp>
+      <p:sp>
+        <p:nvSpPr>
+          <p:cNvPr id="9" name="Oval 8"/>
+          <p:cNvSpPr/>
+          <p:nvPr/>
+        </p:nvSpPr>
+        <p:spPr>
+          <a:xfrm>
+            <a:off x="26681" y="3431234"/>
+            <a:ext cx="3919052" cy="1635563"/>
+          </a:xfrm>
+          <a:prstGeom prst="ellipse">
+            <a:avLst/>
+          </a:prstGeom>
+          <a:solidFill>
+            <a:schemeClr val="accent5">
+              <a:lumMod val="75000"/>
+            </a:schemeClr>
+          </a:solidFill>
+        </p:spPr>
+        <p:style>
+          <a:lnRef idx="2">
+            <a:schemeClr val="accent1">
+              <a:shade val="50000"/>
+            </a:schemeClr>
+          </a:lnRef>
+          <a:fillRef idx="1">
+            <a:schemeClr val="accent1"/>
+          </a:fillRef>
+          <a:effectRef idx="0">
+            <a:schemeClr val="accent1"/>
+          </a:effectRef>
+          <a:fontRef idx="minor">
+            <a:schemeClr val="lt1"/>
+          </a:fontRef>
+        </p:style>
+        <p:txBody>
+          <a:bodyPr rtlCol="0" anchor="ctr"/>
+          <a:lstStyle/>
+          <a:p>
+            <a:r>
+              <a:rPr lang="en-US" dirty="0"/>
+              <a:t>A computer inside another device used for</a:t>
+            </a:r>
+          </a:p>
+          <a:p>
+            <a:r>
+              <a:rPr lang="en-US" dirty="0"/>
+              <a:t>running one predetermined application or</a:t>
+            </a:r>
+          </a:p>
+          <a:p>
+            <a:r>
+              <a:rPr lang="en-US" dirty="0"/>
+              <a:t>collection of software.</a:t>
+            </a:r>
+          </a:p>
+        </p:txBody>
+      </p:sp>
+      <p:cxnSp>
+        <p:nvCxnSpPr>
+          <p:cNvPr id="3" name="Straight Arrow Connector 2"/>
+          <p:cNvCxnSpPr>
+            <a:stCxn id="4" idx="0"/>
+            <a:endCxn id="5" idx="4"/>
+          </p:cNvCxnSpPr>
+          <p:nvPr/>
+        </p:nvCxnSpPr>
+        <p:spPr>
+          <a:xfrm flipH="1" flipV="1">
+            <a:off x="4831308" y="1595651"/>
+            <a:ext cx="725305" cy="1243084"/>
+          </a:xfrm>
+          <a:prstGeom prst="straightConnector1">
+            <a:avLst/>
+          </a:prstGeom>
+          <a:ln w="76200">
+            <a:tailEnd type="triangle"/>
+          </a:ln>
+        </p:spPr>
+        <p:style>
+          <a:lnRef idx="1">
+            <a:schemeClr val="accent1"/>
+          </a:lnRef>
+          <a:fillRef idx="0">
+            <a:schemeClr val="accent1"/>
+          </a:fillRef>
+          <a:effectRef idx="0">
+            <a:schemeClr val="accent1"/>
+          </a:effectRef>
+          <a:fontRef idx="minor">
+            <a:schemeClr val="tx1"/>
+          </a:fontRef>
+        </p:style>
+      </p:cxnSp>
+      <p:sp>
+        <p:nvSpPr>
+          <p:cNvPr id="13" name="Rectangle 12"/>
+          <p:cNvSpPr/>
+          <p:nvPr/>
+        </p:nvSpPr>
+        <p:spPr>
+          <a:xfrm>
+            <a:off x="4918800" y="1950037"/>
+            <a:ext cx="1511419" cy="400110"/>
+          </a:xfrm>
+          <a:prstGeom prst="rect">
+            <a:avLst/>
+          </a:prstGeom>
+        </p:spPr>
+        <p:txBody>
+          <a:bodyPr wrap="square">
+            <a:spAutoFit/>
+          </a:bodyPr>
+          <a:lstStyle/>
+          <a:p>
+            <a:pPr algn="ctr"/>
+            <a:r>
+              <a:rPr lang="en-US" sz="2000" b="1" dirty="0" smtClean="0"/>
+              <a:t>Desktop</a:t>
+            </a:r>
+            <a:endParaRPr lang="en-US" sz="2000" b="1" dirty="0"/>
+          </a:p>
+        </p:txBody>
+      </p:sp>
+      <p:cxnSp>
+        <p:nvCxnSpPr>
+          <p:cNvPr id="14" name="Straight Arrow Connector 13"/>
+          <p:cNvCxnSpPr/>
+          <p:nvPr/>
+        </p:nvCxnSpPr>
+        <p:spPr>
+          <a:xfrm flipV="1">
+            <a:off x="7071515" y="1737659"/>
+            <a:ext cx="2339754" cy="1101076"/>
+          </a:xfrm>
+          <a:prstGeom prst="straightConnector1">
+            <a:avLst/>
+          </a:prstGeom>
+          <a:ln w="76200">
+            <a:tailEnd type="triangle"/>
+          </a:ln>
+        </p:spPr>
+        <p:style>
+          <a:lnRef idx="1">
+            <a:schemeClr val="accent1"/>
+          </a:lnRef>
+          <a:fillRef idx="0">
+            <a:schemeClr val="accent1"/>
+          </a:fillRef>
+          <a:effectRef idx="0">
+            <a:schemeClr val="accent1"/>
+          </a:effectRef>
+          <a:fontRef idx="minor">
+            <a:schemeClr val="tx1"/>
+          </a:fontRef>
+        </p:style>
+      </p:cxnSp>
+      <p:cxnSp>
+        <p:nvCxnSpPr>
+          <p:cNvPr id="23" name="Straight Arrow Connector 22"/>
+          <p:cNvCxnSpPr>
+            <a:stCxn id="4" idx="1"/>
+          </p:cNvCxnSpPr>
+          <p:nvPr/>
+        </p:nvCxnSpPr>
+        <p:spPr>
+          <a:xfrm flipH="1">
+            <a:off x="2879092" y="3189258"/>
+            <a:ext cx="1012794" cy="350523"/>
+          </a:xfrm>
+          <a:prstGeom prst="straightConnector1">
+            <a:avLst/>
+          </a:prstGeom>
+          <a:ln w="76200">
+            <a:tailEnd type="triangle"/>
+          </a:ln>
+        </p:spPr>
+        <p:style>
+          <a:lnRef idx="1">
+            <a:schemeClr val="accent1"/>
+          </a:lnRef>
+          <a:fillRef idx="0">
+            <a:schemeClr val="accent1"/>
+          </a:fillRef>
+          <a:effectRef idx="0">
+            <a:schemeClr val="accent1"/>
+          </a:effectRef>
+          <a:fontRef idx="minor">
+            <a:schemeClr val="tx1"/>
+          </a:fontRef>
+        </p:style>
+      </p:cxnSp>
+      <p:cxnSp>
+        <p:nvCxnSpPr>
+          <p:cNvPr id="26" name="Straight Arrow Connector 25"/>
+          <p:cNvCxnSpPr>
+            <a:stCxn id="4" idx="2"/>
+            <a:endCxn id="8" idx="1"/>
+          </p:cNvCxnSpPr>
+          <p:nvPr/>
+        </p:nvCxnSpPr>
+        <p:spPr>
+          <a:xfrm flipH="1">
+            <a:off x="5322898" y="3539781"/>
+            <a:ext cx="233715" cy="1527016"/>
+          </a:xfrm>
+          <a:prstGeom prst="straightConnector1">
+            <a:avLst/>
+          </a:prstGeom>
+          <a:ln w="76200">
+            <a:tailEnd type="triangle"/>
+          </a:ln>
+        </p:spPr>
+        <p:style>
+          <a:lnRef idx="1">
+            <a:schemeClr val="accent1"/>
+          </a:lnRef>
+          <a:fillRef idx="0">
+            <a:schemeClr val="accent1"/>
+          </a:fillRef>
+          <a:effectRef idx="0">
+            <a:schemeClr val="accent1"/>
+          </a:effectRef>
+          <a:fontRef idx="minor">
+            <a:schemeClr val="tx1"/>
+          </a:fontRef>
+        </p:style>
+      </p:cxnSp>
+      <p:cxnSp>
+        <p:nvCxnSpPr>
+          <p:cNvPr id="28" name="Straight Arrow Connector 27"/>
+          <p:cNvCxnSpPr>
+            <a:stCxn id="4" idx="3"/>
+            <a:endCxn id="7" idx="2"/>
+          </p:cNvCxnSpPr>
+          <p:nvPr/>
+        </p:nvCxnSpPr>
+        <p:spPr>
+          <a:xfrm>
+            <a:off x="7221339" y="3189258"/>
+            <a:ext cx="1525383" cy="180602"/>
+          </a:xfrm>
+          <a:prstGeom prst="straightConnector1">
+            <a:avLst/>
+          </a:prstGeom>
+          <a:ln w="76200">
+            <a:tailEnd type="triangle"/>
+          </a:ln>
+        </p:spPr>
+        <p:style>
+          <a:lnRef idx="1">
+            <a:schemeClr val="accent1"/>
+          </a:lnRef>
+          <a:fillRef idx="0">
+            <a:schemeClr val="accent1"/>
+          </a:fillRef>
+          <a:effectRef idx="0">
+            <a:schemeClr val="accent1"/>
+          </a:effectRef>
+          <a:fontRef idx="minor">
+            <a:schemeClr val="tx1"/>
+          </a:fontRef>
+        </p:style>
+      </p:cxnSp>
+      <p:sp>
+        <p:nvSpPr>
+          <p:cNvPr id="30" name="Rectangle 29"/>
+          <p:cNvSpPr/>
+          <p:nvPr/>
+        </p:nvSpPr>
+        <p:spPr>
+          <a:xfrm>
+            <a:off x="6930456" y="2021612"/>
+            <a:ext cx="1364781" cy="400110"/>
+          </a:xfrm>
+          <a:prstGeom prst="rect">
+            <a:avLst/>
+          </a:prstGeom>
+        </p:spPr>
+        <p:txBody>
+          <a:bodyPr wrap="square">
+            <a:spAutoFit/>
+          </a:bodyPr>
+          <a:lstStyle/>
+          <a:p>
+            <a:pPr algn="ctr"/>
+            <a:r>
+              <a:rPr lang="en-US" sz="2000" b="1" dirty="0" smtClean="0"/>
+              <a:t>Server</a:t>
+            </a:r>
+            <a:endParaRPr lang="en-US" sz="2000" b="1" dirty="0"/>
+          </a:p>
+        </p:txBody>
+      </p:sp>
+      <p:sp>
+        <p:nvSpPr>
+          <p:cNvPr id="32" name="Rectangle 31"/>
+          <p:cNvSpPr/>
+          <p:nvPr/>
+        </p:nvSpPr>
+        <p:spPr>
+          <a:xfrm>
+            <a:off x="7303828" y="3300107"/>
+            <a:ext cx="1710814" cy="707886"/>
+          </a:xfrm>
+          <a:prstGeom prst="rect">
+            <a:avLst/>
+          </a:prstGeom>
+        </p:spPr>
+        <p:txBody>
+          <a:bodyPr wrap="square">
+            <a:spAutoFit/>
+          </a:bodyPr>
+          <a:lstStyle/>
+          <a:p>
+            <a:pPr algn="ctr"/>
+            <a:r>
+              <a:rPr lang="en-US" sz="2000" b="1" dirty="0" smtClean="0"/>
+              <a:t>Super-Computers</a:t>
+            </a:r>
+            <a:endParaRPr lang="en-US" sz="2000" b="1" dirty="0"/>
+          </a:p>
+        </p:txBody>
+      </p:sp>
+      <p:sp>
+        <p:nvSpPr>
+          <p:cNvPr id="49" name="Rectangle 48"/>
+          <p:cNvSpPr/>
+          <p:nvPr/>
+        </p:nvSpPr>
+        <p:spPr>
+          <a:xfrm>
+            <a:off x="5360701" y="4269199"/>
+            <a:ext cx="1710814" cy="400110"/>
+          </a:xfrm>
+          <a:prstGeom prst="rect">
+            <a:avLst/>
+          </a:prstGeom>
+        </p:spPr>
+        <p:txBody>
+          <a:bodyPr wrap="square">
+            <a:spAutoFit/>
+          </a:bodyPr>
+          <a:lstStyle/>
+          <a:p>
+            <a:pPr algn="ctr"/>
+            <a:r>
+              <a:rPr lang="en-US" sz="2000" b="1" dirty="0" smtClean="0"/>
+              <a:t>Datacenter</a:t>
+            </a:r>
+            <a:endParaRPr lang="en-US" sz="2000" b="1" dirty="0"/>
+          </a:p>
+        </p:txBody>
+      </p:sp>
+      <p:sp>
+        <p:nvSpPr>
+          <p:cNvPr id="55" name="Rectangle 54"/>
+          <p:cNvSpPr/>
+          <p:nvPr/>
+        </p:nvSpPr>
+        <p:spPr>
+          <a:xfrm>
+            <a:off x="26681" y="2638680"/>
+            <a:ext cx="2722120" cy="400110"/>
+          </a:xfrm>
+          <a:prstGeom prst="rect">
+            <a:avLst/>
+          </a:prstGeom>
+        </p:spPr>
+        <p:txBody>
+          <a:bodyPr wrap="square">
+            <a:spAutoFit/>
+          </a:bodyPr>
+          <a:lstStyle/>
+          <a:p>
+            <a:pPr algn="ctr"/>
+            <a:r>
+              <a:rPr lang="en-US" sz="2000" b="1" dirty="0" smtClean="0"/>
+              <a:t>Embedded-Computer</a:t>
+            </a:r>
+            <a:endParaRPr lang="en-US" sz="2000" b="1" dirty="0"/>
+          </a:p>
+        </p:txBody>
+      </p:sp>
+    </p:spTree>
+    <p:extLst>
+      <p:ext uri="{BB962C8B-B14F-4D97-AF65-F5344CB8AC3E}">
+        <p14:creationId xmlns:p14="http://schemas.microsoft.com/office/powerpoint/2010/main" val="4244997172"/>
       </p:ext>
     </p:extLst>
   </p:cSld>

</xml_diff>

<commit_message>
Added about Some terms of CSA
</commit_message>
<xml_diff>
--- a/Intro.pptx
+++ b/Intro.pptx
@@ -7,6 +7,7 @@
   <p:sldIdLst>
     <p:sldId id="257" r:id="rId2"/>
     <p:sldId id="258" r:id="rId3"/>
+    <p:sldId id="259" r:id="rId4"/>
   </p:sldIdLst>
   <p:sldSz cx="12192000" cy="6858000"/>
   <p:notesSz cx="6858000" cy="9144000"/>
@@ -4101,6 +4102,596 @@
 </p:sld>
 </file>
 
+<file path=ppt/slides/slide3.xml><?xml version="1.0" encoding="utf-8"?>
+<p:sld xmlns:a="http://schemas.openxmlformats.org/drawingml/2006/main" xmlns:r="http://schemas.openxmlformats.org/officeDocument/2006/relationships" xmlns:p="http://schemas.openxmlformats.org/presentationml/2006/main">
+  <p:cSld>
+    <p:spTree>
+      <p:nvGrpSpPr>
+        <p:cNvPr id="1" name=""/>
+        <p:cNvGrpSpPr/>
+        <p:nvPr/>
+      </p:nvGrpSpPr>
+      <p:grpSpPr>
+        <a:xfrm>
+          <a:off x="0" y="0"/>
+          <a:ext cx="0" cy="0"/>
+          <a:chOff x="0" y="0"/>
+          <a:chExt cx="0" cy="0"/>
+        </a:xfrm>
+      </p:grpSpPr>
+      <p:sp>
+        <p:nvSpPr>
+          <p:cNvPr id="4" name="Rounded Rectangle 3"/>
+          <p:cNvSpPr/>
+          <p:nvPr/>
+        </p:nvSpPr>
+        <p:spPr>
+          <a:xfrm>
+            <a:off x="3891886" y="2838735"/>
+            <a:ext cx="3329453" cy="701046"/>
+          </a:xfrm>
+          <a:prstGeom prst="roundRect">
+            <a:avLst/>
+          </a:prstGeom>
+        </p:spPr>
+        <p:style>
+          <a:lnRef idx="2">
+            <a:schemeClr val="accent1">
+              <a:shade val="50000"/>
+            </a:schemeClr>
+          </a:lnRef>
+          <a:fillRef idx="1">
+            <a:schemeClr val="accent1"/>
+          </a:fillRef>
+          <a:effectRef idx="0">
+            <a:schemeClr val="accent1"/>
+          </a:effectRef>
+          <a:fontRef idx="minor">
+            <a:schemeClr val="lt1"/>
+          </a:fontRef>
+        </p:style>
+        <p:txBody>
+          <a:bodyPr rtlCol="0" anchor="ctr"/>
+          <a:lstStyle/>
+          <a:p>
+            <a:pPr algn="ctr"/>
+            <a:r>
+              <a:rPr lang="en-US" sz="3200" dirty="0" smtClean="0"/>
+              <a:t>terms</a:t>
+            </a:r>
+            <a:endParaRPr lang="en-US" sz="3200" dirty="0"/>
+          </a:p>
+        </p:txBody>
+      </p:sp>
+      <p:sp>
+        <p:nvSpPr>
+          <p:cNvPr id="5" name="Oval 4"/>
+          <p:cNvSpPr/>
+          <p:nvPr/>
+        </p:nvSpPr>
+        <p:spPr>
+          <a:xfrm>
+            <a:off x="0" y="423171"/>
+            <a:ext cx="6114197" cy="1377287"/>
+          </a:xfrm>
+          <a:prstGeom prst="ellipse">
+            <a:avLst/>
+          </a:prstGeom>
+          <a:solidFill>
+            <a:srgbClr val="FFC000"/>
+          </a:solidFill>
+        </p:spPr>
+        <p:style>
+          <a:lnRef idx="2">
+            <a:schemeClr val="accent1">
+              <a:shade val="50000"/>
+            </a:schemeClr>
+          </a:lnRef>
+          <a:fillRef idx="1">
+            <a:schemeClr val="accent1"/>
+          </a:fillRef>
+          <a:effectRef idx="0">
+            <a:schemeClr val="accent1"/>
+          </a:effectRef>
+          <a:fontRef idx="minor">
+            <a:schemeClr val="lt1"/>
+          </a:fontRef>
+        </p:style>
+        <p:txBody>
+          <a:bodyPr rtlCol="0" anchor="ctr"/>
+          <a:lstStyle/>
+          <a:p>
+            <a:pPr algn="ctr"/>
+            <a:r>
+              <a:rPr lang="en-US" sz="2000" dirty="0"/>
+              <a:t>A microprocessor containing multiple</a:t>
+            </a:r>
+          </a:p>
+          <a:p>
+            <a:pPr algn="ctr"/>
+            <a:r>
+              <a:rPr lang="en-US" sz="2000" dirty="0" smtClean="0"/>
+              <a:t>Processors (cores) </a:t>
+            </a:r>
+            <a:r>
+              <a:rPr lang="en-US" sz="2000" dirty="0"/>
+              <a:t>in a single integrated</a:t>
+            </a:r>
+          </a:p>
+          <a:p>
+            <a:pPr algn="ctr"/>
+            <a:r>
+              <a:rPr lang="en-US" sz="2000" dirty="0"/>
+              <a:t>circuit.</a:t>
+            </a:r>
+          </a:p>
+        </p:txBody>
+      </p:sp>
+      <p:sp>
+        <p:nvSpPr>
+          <p:cNvPr id="6" name="Oval 5"/>
+          <p:cNvSpPr/>
+          <p:nvPr/>
+        </p:nvSpPr>
+        <p:spPr>
+          <a:xfrm>
+            <a:off x="7303827" y="0"/>
+            <a:ext cx="4665260" cy="1710363"/>
+          </a:xfrm>
+          <a:prstGeom prst="ellipse">
+            <a:avLst/>
+          </a:prstGeom>
+          <a:solidFill>
+            <a:srgbClr val="00B0F0"/>
+          </a:solidFill>
+        </p:spPr>
+        <p:style>
+          <a:lnRef idx="2">
+            <a:schemeClr val="accent1">
+              <a:shade val="50000"/>
+            </a:schemeClr>
+          </a:lnRef>
+          <a:fillRef idx="1">
+            <a:schemeClr val="accent1"/>
+          </a:fillRef>
+          <a:effectRef idx="0">
+            <a:schemeClr val="accent1"/>
+          </a:effectRef>
+          <a:fontRef idx="minor">
+            <a:schemeClr val="lt1"/>
+          </a:fontRef>
+        </p:style>
+        <p:txBody>
+          <a:bodyPr rtlCol="0" anchor="ctr"/>
+          <a:lstStyle/>
+          <a:p>
+            <a:pPr algn="ctr"/>
+            <a:r>
+              <a:rPr lang="en-US" dirty="0"/>
+              <a:t>that provides services that are</a:t>
+            </a:r>
+          </a:p>
+          <a:p>
+            <a:pPr algn="ctr"/>
+            <a:r>
+              <a:rPr lang="en-US" dirty="0"/>
+              <a:t>commonly useful, including operating</a:t>
+            </a:r>
+          </a:p>
+          <a:p>
+            <a:pPr algn="ctr"/>
+            <a:r>
+              <a:rPr lang="en-US" dirty="0"/>
+              <a:t>systems, compilers, loaders, and assemblers.</a:t>
+            </a:r>
+          </a:p>
+        </p:txBody>
+      </p:sp>
+      <p:sp>
+        <p:nvSpPr>
+          <p:cNvPr id="7" name="Oval 6"/>
+          <p:cNvSpPr/>
+          <p:nvPr/>
+        </p:nvSpPr>
+        <p:spPr>
+          <a:xfrm>
+            <a:off x="7612846" y="3884865"/>
+            <a:ext cx="3029803" cy="2763671"/>
+          </a:xfrm>
+          <a:prstGeom prst="ellipse">
+            <a:avLst/>
+          </a:prstGeom>
+          <a:solidFill>
+            <a:srgbClr val="7030A0"/>
+          </a:solidFill>
+        </p:spPr>
+        <p:style>
+          <a:lnRef idx="2">
+            <a:schemeClr val="accent1">
+              <a:shade val="50000"/>
+            </a:schemeClr>
+          </a:lnRef>
+          <a:fillRef idx="1">
+            <a:schemeClr val="accent1"/>
+          </a:fillRef>
+          <a:effectRef idx="0">
+            <a:schemeClr val="accent1"/>
+          </a:effectRef>
+          <a:fontRef idx="minor">
+            <a:schemeClr val="lt1"/>
+          </a:fontRef>
+        </p:style>
+        <p:txBody>
+          <a:bodyPr rtlCol="0" anchor="ctr"/>
+          <a:lstStyle/>
+          <a:p>
+            <a:r>
+              <a:rPr lang="en-US" dirty="0"/>
+              <a:t>Supervising program that manages the</a:t>
+            </a:r>
+          </a:p>
+          <a:p>
+            <a:r>
+              <a:rPr lang="en-US" dirty="0"/>
+              <a:t>resources of a computer for the benefit of the</a:t>
+            </a:r>
+          </a:p>
+          <a:p>
+            <a:r>
+              <a:rPr lang="en-US" dirty="0"/>
+              <a:t>programs that run on that computer</a:t>
+            </a:r>
+          </a:p>
+        </p:txBody>
+      </p:sp>
+      <p:sp>
+        <p:nvSpPr>
+          <p:cNvPr id="8" name="Oval 7"/>
+          <p:cNvSpPr/>
+          <p:nvPr/>
+        </p:nvSpPr>
+        <p:spPr>
+          <a:xfrm>
+            <a:off x="705850" y="4356904"/>
+            <a:ext cx="3522354" cy="1819594"/>
+          </a:xfrm>
+          <a:prstGeom prst="ellipse">
+            <a:avLst/>
+          </a:prstGeom>
+          <a:solidFill>
+            <a:srgbClr val="00B050"/>
+          </a:solidFill>
+          <a:ln>
+            <a:solidFill>
+              <a:srgbClr val="00B050"/>
+            </a:solidFill>
+          </a:ln>
+        </p:spPr>
+        <p:style>
+          <a:lnRef idx="2">
+            <a:schemeClr val="accent1">
+              <a:shade val="50000"/>
+            </a:schemeClr>
+          </a:lnRef>
+          <a:fillRef idx="1">
+            <a:schemeClr val="accent1"/>
+          </a:fillRef>
+          <a:effectRef idx="0">
+            <a:schemeClr val="accent1"/>
+          </a:effectRef>
+          <a:fontRef idx="minor">
+            <a:schemeClr val="lt1"/>
+          </a:fontRef>
+        </p:style>
+        <p:txBody>
+          <a:bodyPr rtlCol="0" anchor="ctr"/>
+          <a:lstStyle/>
+          <a:p>
+            <a:pPr algn="ctr"/>
+            <a:r>
+              <a:rPr lang="en-US" dirty="0"/>
+              <a:t>A program that translates high level language</a:t>
+            </a:r>
+          </a:p>
+          <a:p>
+            <a:pPr algn="ctr"/>
+            <a:r>
+              <a:rPr lang="en-US" dirty="0"/>
+              <a:t>statements into assembly language</a:t>
+            </a:r>
+          </a:p>
+          <a:p>
+            <a:pPr algn="ctr"/>
+            <a:r>
+              <a:rPr lang="en-US" dirty="0"/>
+              <a:t>statements.</a:t>
+            </a:r>
+          </a:p>
+        </p:txBody>
+      </p:sp>
+      <p:cxnSp>
+        <p:nvCxnSpPr>
+          <p:cNvPr id="3" name="Straight Arrow Connector 2"/>
+          <p:cNvCxnSpPr>
+            <a:stCxn id="4" idx="0"/>
+            <a:endCxn id="5" idx="4"/>
+          </p:cNvCxnSpPr>
+          <p:nvPr/>
+        </p:nvCxnSpPr>
+        <p:spPr>
+          <a:xfrm flipH="1" flipV="1">
+            <a:off x="3057099" y="1800458"/>
+            <a:ext cx="2499514" cy="1038277"/>
+          </a:xfrm>
+          <a:prstGeom prst="straightConnector1">
+            <a:avLst/>
+          </a:prstGeom>
+          <a:ln w="76200">
+            <a:tailEnd type="triangle"/>
+          </a:ln>
+        </p:spPr>
+        <p:style>
+          <a:lnRef idx="1">
+            <a:schemeClr val="accent1"/>
+          </a:lnRef>
+          <a:fillRef idx="0">
+            <a:schemeClr val="accent1"/>
+          </a:fillRef>
+          <a:effectRef idx="0">
+            <a:schemeClr val="accent1"/>
+          </a:effectRef>
+          <a:fontRef idx="minor">
+            <a:schemeClr val="tx1"/>
+          </a:fontRef>
+        </p:style>
+      </p:cxnSp>
+      <p:sp>
+        <p:nvSpPr>
+          <p:cNvPr id="13" name="Rectangle 12"/>
+          <p:cNvSpPr/>
+          <p:nvPr/>
+        </p:nvSpPr>
+        <p:spPr>
+          <a:xfrm>
+            <a:off x="4082940" y="1842405"/>
+            <a:ext cx="1511419" cy="400110"/>
+          </a:xfrm>
+          <a:prstGeom prst="rect">
+            <a:avLst/>
+          </a:prstGeom>
+        </p:spPr>
+        <p:txBody>
+          <a:bodyPr wrap="square">
+            <a:spAutoFit/>
+          </a:bodyPr>
+          <a:lstStyle/>
+          <a:p>
+            <a:pPr algn="ctr"/>
+            <a:r>
+              <a:rPr lang="en-US" sz="2000" b="1" dirty="0" smtClean="0"/>
+              <a:t>Multicore</a:t>
+            </a:r>
+            <a:endParaRPr lang="en-US" sz="2000" b="1" dirty="0"/>
+          </a:p>
+        </p:txBody>
+      </p:sp>
+      <p:cxnSp>
+        <p:nvCxnSpPr>
+          <p:cNvPr id="14" name="Straight Arrow Connector 13"/>
+          <p:cNvCxnSpPr/>
+          <p:nvPr/>
+        </p:nvCxnSpPr>
+        <p:spPr>
+          <a:xfrm flipV="1">
+            <a:off x="7071515" y="1737659"/>
+            <a:ext cx="2339754" cy="1101076"/>
+          </a:xfrm>
+          <a:prstGeom prst="straightConnector1">
+            <a:avLst/>
+          </a:prstGeom>
+          <a:ln w="76200">
+            <a:tailEnd type="triangle"/>
+          </a:ln>
+        </p:spPr>
+        <p:style>
+          <a:lnRef idx="1">
+            <a:schemeClr val="accent1"/>
+          </a:lnRef>
+          <a:fillRef idx="0">
+            <a:schemeClr val="accent1"/>
+          </a:fillRef>
+          <a:effectRef idx="0">
+            <a:schemeClr val="accent1"/>
+          </a:effectRef>
+          <a:fontRef idx="minor">
+            <a:schemeClr val="tx1"/>
+          </a:fontRef>
+        </p:style>
+      </p:cxnSp>
+      <p:cxnSp>
+        <p:nvCxnSpPr>
+          <p:cNvPr id="26" name="Straight Arrow Connector 25"/>
+          <p:cNvCxnSpPr>
+            <a:stCxn id="4" idx="2"/>
+            <a:endCxn id="8" idx="1"/>
+          </p:cNvCxnSpPr>
+          <p:nvPr/>
+        </p:nvCxnSpPr>
+        <p:spPr>
+          <a:xfrm flipH="1">
+            <a:off x="1221687" y="3539781"/>
+            <a:ext cx="4334926" cy="1083596"/>
+          </a:xfrm>
+          <a:prstGeom prst="straightConnector1">
+            <a:avLst/>
+          </a:prstGeom>
+          <a:ln w="76200">
+            <a:tailEnd type="triangle"/>
+          </a:ln>
+        </p:spPr>
+        <p:style>
+          <a:lnRef idx="1">
+            <a:schemeClr val="accent1"/>
+          </a:lnRef>
+          <a:fillRef idx="0">
+            <a:schemeClr val="accent1"/>
+          </a:fillRef>
+          <a:effectRef idx="0">
+            <a:schemeClr val="accent1"/>
+          </a:effectRef>
+          <a:fontRef idx="minor">
+            <a:schemeClr val="tx1"/>
+          </a:fontRef>
+        </p:style>
+      </p:cxnSp>
+      <p:cxnSp>
+        <p:nvCxnSpPr>
+          <p:cNvPr id="28" name="Straight Arrow Connector 27"/>
+          <p:cNvCxnSpPr>
+            <a:stCxn id="4" idx="3"/>
+            <a:endCxn id="7" idx="2"/>
+          </p:cNvCxnSpPr>
+          <p:nvPr/>
+        </p:nvCxnSpPr>
+        <p:spPr>
+          <a:xfrm>
+            <a:off x="7221339" y="3189258"/>
+            <a:ext cx="391507" cy="2077443"/>
+          </a:xfrm>
+          <a:prstGeom prst="straightConnector1">
+            <a:avLst/>
+          </a:prstGeom>
+          <a:ln w="76200">
+            <a:tailEnd type="triangle"/>
+          </a:ln>
+        </p:spPr>
+        <p:style>
+          <a:lnRef idx="1">
+            <a:schemeClr val="accent1"/>
+          </a:lnRef>
+          <a:fillRef idx="0">
+            <a:schemeClr val="accent1"/>
+          </a:fillRef>
+          <a:effectRef idx="0">
+            <a:schemeClr val="accent1"/>
+          </a:effectRef>
+          <a:fontRef idx="minor">
+            <a:schemeClr val="tx1"/>
+          </a:fontRef>
+        </p:style>
+      </p:cxnSp>
+      <p:sp>
+        <p:nvSpPr>
+          <p:cNvPr id="30" name="Rectangle 29"/>
+          <p:cNvSpPr/>
+          <p:nvPr/>
+        </p:nvSpPr>
+        <p:spPr>
+          <a:xfrm>
+            <a:off x="6930456" y="2021612"/>
+            <a:ext cx="1364781" cy="1015663"/>
+          </a:xfrm>
+          <a:prstGeom prst="rect">
+            <a:avLst/>
+          </a:prstGeom>
+        </p:spPr>
+        <p:txBody>
+          <a:bodyPr wrap="square">
+            <a:spAutoFit/>
+          </a:bodyPr>
+          <a:lstStyle/>
+          <a:p>
+            <a:pPr algn="ctr"/>
+            <a:r>
+              <a:rPr lang="en-US" sz="2000" b="1" dirty="0"/>
+              <a:t>System Software</a:t>
+            </a:r>
+          </a:p>
+          <a:p>
+            <a:pPr algn="ctr"/>
+            <a:endParaRPr lang="en-US" sz="2000" b="1" dirty="0"/>
+          </a:p>
+        </p:txBody>
+      </p:sp>
+      <p:sp>
+        <p:nvSpPr>
+          <p:cNvPr id="32" name="Rectangle 31"/>
+          <p:cNvSpPr/>
+          <p:nvPr/>
+        </p:nvSpPr>
+        <p:spPr>
+          <a:xfrm>
+            <a:off x="6381651" y="3854398"/>
+            <a:ext cx="1710814" cy="1015663"/>
+          </a:xfrm>
+          <a:prstGeom prst="rect">
+            <a:avLst/>
+          </a:prstGeom>
+        </p:spPr>
+        <p:txBody>
+          <a:bodyPr wrap="square">
+            <a:spAutoFit/>
+          </a:bodyPr>
+          <a:lstStyle/>
+          <a:p>
+            <a:pPr algn="ctr"/>
+            <a:r>
+              <a:rPr lang="en-US" sz="2000" b="1" dirty="0"/>
+              <a:t>Operating System</a:t>
+            </a:r>
+          </a:p>
+          <a:p>
+            <a:pPr algn="ctr"/>
+            <a:endParaRPr lang="en-US" sz="2000" b="1" dirty="0"/>
+          </a:p>
+        </p:txBody>
+      </p:sp>
+      <p:sp>
+        <p:nvSpPr>
+          <p:cNvPr id="49" name="Rectangle 48"/>
+          <p:cNvSpPr/>
+          <p:nvPr/>
+        </p:nvSpPr>
+        <p:spPr>
+          <a:xfrm>
+            <a:off x="2946262" y="4081579"/>
+            <a:ext cx="1710814" cy="707886"/>
+          </a:xfrm>
+          <a:prstGeom prst="rect">
+            <a:avLst/>
+          </a:prstGeom>
+        </p:spPr>
+        <p:txBody>
+          <a:bodyPr wrap="square">
+            <a:spAutoFit/>
+          </a:bodyPr>
+          <a:lstStyle/>
+          <a:p>
+            <a:pPr algn="ctr"/>
+            <a:r>
+              <a:rPr lang="en-US" sz="2000" b="1" dirty="0"/>
+              <a:t>Compiler</a:t>
+            </a:r>
+          </a:p>
+          <a:p>
+            <a:pPr algn="ctr"/>
+            <a:endParaRPr lang="en-US" sz="2000" b="1" dirty="0"/>
+          </a:p>
+        </p:txBody>
+      </p:sp>
+    </p:spTree>
+    <p:extLst>
+      <p:ext uri="{BB962C8B-B14F-4D97-AF65-F5344CB8AC3E}">
+        <p14:creationId xmlns:p14="http://schemas.microsoft.com/office/powerpoint/2010/main" val="2596077060"/>
+      </p:ext>
+    </p:extLst>
+  </p:cSld>
+  <p:clrMapOvr>
+    <a:masterClrMapping/>
+  </p:clrMapOvr>
+</p:sld>
+</file>
+
 <file path=ppt/theme/theme1.xml><?xml version="1.0" encoding="utf-8"?>
 <a:theme xmlns:a="http://schemas.openxmlformats.org/drawingml/2006/main" name="Office Theme">
   <a:themeElements>

</xml_diff>

<commit_message>
Added about components that depend on program performance
</commit_message>
<xml_diff>
--- a/Intro.pptx
+++ b/Intro.pptx
@@ -8,6 +8,7 @@
     <p:sldId id="257" r:id="rId2"/>
     <p:sldId id="258" r:id="rId3"/>
     <p:sldId id="259" r:id="rId4"/>
+    <p:sldId id="260" r:id="rId5"/>
   </p:sldIdLst>
   <p:sldSz cx="12192000" cy="6858000"/>
   <p:notesSz cx="6858000" cy="9144000"/>
@@ -4692,6 +4693,534 @@
 </p:sld>
 </file>
 
+<file path=ppt/slides/slide4.xml><?xml version="1.0" encoding="utf-8"?>
+<p:sld xmlns:a="http://schemas.openxmlformats.org/drawingml/2006/main" xmlns:r="http://schemas.openxmlformats.org/officeDocument/2006/relationships" xmlns:p="http://schemas.openxmlformats.org/presentationml/2006/main">
+  <p:cSld>
+    <p:spTree>
+      <p:nvGrpSpPr>
+        <p:cNvPr id="1" name=""/>
+        <p:cNvGrpSpPr/>
+        <p:nvPr/>
+      </p:nvGrpSpPr>
+      <p:grpSpPr>
+        <a:xfrm>
+          <a:off x="0" y="0"/>
+          <a:ext cx="0" cy="0"/>
+          <a:chOff x="0" y="0"/>
+          <a:chExt cx="0" cy="0"/>
+        </a:xfrm>
+      </p:grpSpPr>
+      <p:sp>
+        <p:nvSpPr>
+          <p:cNvPr id="4" name="Rounded Rectangle 3"/>
+          <p:cNvSpPr/>
+          <p:nvPr/>
+        </p:nvSpPr>
+        <p:spPr>
+          <a:xfrm>
+            <a:off x="3891886" y="2838735"/>
+            <a:ext cx="3329453" cy="701046"/>
+          </a:xfrm>
+          <a:prstGeom prst="roundRect">
+            <a:avLst/>
+          </a:prstGeom>
+        </p:spPr>
+        <p:style>
+          <a:lnRef idx="2">
+            <a:schemeClr val="accent1">
+              <a:shade val="50000"/>
+            </a:schemeClr>
+          </a:lnRef>
+          <a:fillRef idx="1">
+            <a:schemeClr val="accent1"/>
+          </a:fillRef>
+          <a:effectRef idx="0">
+            <a:schemeClr val="accent1"/>
+          </a:effectRef>
+          <a:fontRef idx="minor">
+            <a:schemeClr val="lt1"/>
+          </a:fontRef>
+        </p:style>
+        <p:txBody>
+          <a:bodyPr rtlCol="0" anchor="ctr"/>
+          <a:lstStyle/>
+          <a:p>
+            <a:pPr algn="ctr"/>
+            <a:r>
+              <a:rPr lang="en-US" sz="2400" dirty="0" smtClean="0"/>
+              <a:t>Program Performance</a:t>
+            </a:r>
+            <a:endParaRPr lang="en-US" sz="3200" dirty="0"/>
+          </a:p>
+        </p:txBody>
+      </p:sp>
+      <p:sp>
+        <p:nvSpPr>
+          <p:cNvPr id="5" name="Oval 4"/>
+          <p:cNvSpPr/>
+          <p:nvPr/>
+        </p:nvSpPr>
+        <p:spPr>
+          <a:xfrm>
+            <a:off x="191070" y="218364"/>
+            <a:ext cx="6155140" cy="1377287"/>
+          </a:xfrm>
+          <a:prstGeom prst="ellipse">
+            <a:avLst/>
+          </a:prstGeom>
+          <a:solidFill>
+            <a:srgbClr val="FFC000"/>
+          </a:solidFill>
+        </p:spPr>
+        <p:style>
+          <a:lnRef idx="2">
+            <a:schemeClr val="accent1">
+              <a:shade val="50000"/>
+            </a:schemeClr>
+          </a:lnRef>
+          <a:fillRef idx="1">
+            <a:schemeClr val="accent1"/>
+          </a:fillRef>
+          <a:effectRef idx="0">
+            <a:schemeClr val="accent1"/>
+          </a:effectRef>
+          <a:fontRef idx="minor">
+            <a:schemeClr val="lt1"/>
+          </a:fontRef>
+        </p:style>
+        <p:txBody>
+          <a:bodyPr rtlCol="0" anchor="ctr"/>
+          <a:lstStyle/>
+          <a:p>
+            <a:pPr algn="ctr"/>
+            <a:r>
+              <a:rPr lang="en-US" sz="2000" dirty="0" smtClean="0"/>
+              <a:t>Determines both no of source-level statements and the number of I/0 operations executed</a:t>
+            </a:r>
+            <a:endParaRPr lang="en-US" sz="2000" dirty="0"/>
+          </a:p>
+        </p:txBody>
+      </p:sp>
+      <p:sp>
+        <p:nvSpPr>
+          <p:cNvPr id="6" name="Oval 5"/>
+          <p:cNvSpPr/>
+          <p:nvPr/>
+        </p:nvSpPr>
+        <p:spPr>
+          <a:xfrm>
+            <a:off x="7303827" y="0"/>
+            <a:ext cx="4214883" cy="1710363"/>
+          </a:xfrm>
+          <a:prstGeom prst="ellipse">
+            <a:avLst/>
+          </a:prstGeom>
+          <a:solidFill>
+            <a:srgbClr val="00B0F0"/>
+          </a:solidFill>
+        </p:spPr>
+        <p:style>
+          <a:lnRef idx="2">
+            <a:schemeClr val="accent1">
+              <a:shade val="50000"/>
+            </a:schemeClr>
+          </a:lnRef>
+          <a:fillRef idx="1">
+            <a:schemeClr val="accent1"/>
+          </a:fillRef>
+          <a:effectRef idx="0">
+            <a:schemeClr val="accent1"/>
+          </a:effectRef>
+          <a:fontRef idx="minor">
+            <a:schemeClr val="lt1"/>
+          </a:fontRef>
+        </p:style>
+        <p:txBody>
+          <a:bodyPr rtlCol="0" anchor="ctr"/>
+          <a:lstStyle/>
+          <a:p>
+            <a:pPr algn="ctr"/>
+            <a:r>
+              <a:rPr lang="en-US" dirty="0" smtClean="0"/>
+              <a:t>Determines the number of computer instructions for each source-level statement</a:t>
+            </a:r>
+            <a:endParaRPr lang="en-US" dirty="0"/>
+          </a:p>
+        </p:txBody>
+      </p:sp>
+      <p:sp>
+        <p:nvSpPr>
+          <p:cNvPr id="7" name="Oval 6"/>
+          <p:cNvSpPr/>
+          <p:nvPr/>
+        </p:nvSpPr>
+        <p:spPr>
+          <a:xfrm>
+            <a:off x="8792736" y="4198732"/>
+            <a:ext cx="3029803" cy="1928883"/>
+          </a:xfrm>
+          <a:prstGeom prst="ellipse">
+            <a:avLst/>
+          </a:prstGeom>
+          <a:solidFill>
+            <a:srgbClr val="7030A0"/>
+          </a:solidFill>
+        </p:spPr>
+        <p:style>
+          <a:lnRef idx="2">
+            <a:schemeClr val="accent1">
+              <a:shade val="50000"/>
+            </a:schemeClr>
+          </a:lnRef>
+          <a:fillRef idx="1">
+            <a:schemeClr val="accent1"/>
+          </a:fillRef>
+          <a:effectRef idx="0">
+            <a:schemeClr val="accent1"/>
+          </a:effectRef>
+          <a:fontRef idx="minor">
+            <a:schemeClr val="lt1"/>
+          </a:fontRef>
+        </p:style>
+        <p:txBody>
+          <a:bodyPr rtlCol="0" anchor="ctr"/>
+          <a:lstStyle/>
+          <a:p>
+            <a:pPr algn="ctr"/>
+            <a:r>
+              <a:rPr lang="en-US" dirty="0" smtClean="0"/>
+              <a:t>Determines how fast instructions can be executed</a:t>
+            </a:r>
+            <a:endParaRPr lang="en-US" dirty="0"/>
+          </a:p>
+        </p:txBody>
+      </p:sp>
+      <p:sp>
+        <p:nvSpPr>
+          <p:cNvPr id="8" name="Oval 7"/>
+          <p:cNvSpPr/>
+          <p:nvPr/>
+        </p:nvSpPr>
+        <p:spPr>
+          <a:xfrm>
+            <a:off x="546210" y="4417527"/>
+            <a:ext cx="3755736" cy="1491294"/>
+          </a:xfrm>
+          <a:prstGeom prst="ellipse">
+            <a:avLst/>
+          </a:prstGeom>
+          <a:solidFill>
+            <a:srgbClr val="00B050"/>
+          </a:solidFill>
+          <a:ln>
+            <a:solidFill>
+              <a:srgbClr val="00B050"/>
+            </a:solidFill>
+          </a:ln>
+        </p:spPr>
+        <p:style>
+          <a:lnRef idx="2">
+            <a:schemeClr val="accent1">
+              <a:shade val="50000"/>
+            </a:schemeClr>
+          </a:lnRef>
+          <a:fillRef idx="1">
+            <a:schemeClr val="accent1"/>
+          </a:fillRef>
+          <a:effectRef idx="0">
+            <a:schemeClr val="accent1"/>
+          </a:effectRef>
+          <a:fontRef idx="minor">
+            <a:schemeClr val="lt1"/>
+          </a:fontRef>
+        </p:style>
+        <p:txBody>
+          <a:bodyPr rtlCol="0" anchor="ctr"/>
+          <a:lstStyle/>
+          <a:p>
+            <a:pPr algn="ctr"/>
+            <a:r>
+              <a:rPr lang="en-US" dirty="0" smtClean="0"/>
+              <a:t>Determine how fast I/O operations may be executed</a:t>
+            </a:r>
+            <a:endParaRPr lang="en-US" dirty="0"/>
+          </a:p>
+        </p:txBody>
+      </p:sp>
+      <p:cxnSp>
+        <p:nvCxnSpPr>
+          <p:cNvPr id="3" name="Straight Arrow Connector 2"/>
+          <p:cNvCxnSpPr>
+            <a:stCxn id="4" idx="0"/>
+            <a:endCxn id="5" idx="4"/>
+          </p:cNvCxnSpPr>
+          <p:nvPr/>
+        </p:nvCxnSpPr>
+        <p:spPr>
+          <a:xfrm flipH="1" flipV="1">
+            <a:off x="3268640" y="1595651"/>
+            <a:ext cx="2287973" cy="1243084"/>
+          </a:xfrm>
+          <a:prstGeom prst="straightConnector1">
+            <a:avLst/>
+          </a:prstGeom>
+          <a:ln w="76200">
+            <a:tailEnd type="triangle"/>
+          </a:ln>
+        </p:spPr>
+        <p:style>
+          <a:lnRef idx="1">
+            <a:schemeClr val="accent1"/>
+          </a:lnRef>
+          <a:fillRef idx="0">
+            <a:schemeClr val="accent1"/>
+          </a:fillRef>
+          <a:effectRef idx="0">
+            <a:schemeClr val="accent1"/>
+          </a:effectRef>
+          <a:fontRef idx="minor">
+            <a:schemeClr val="tx1"/>
+          </a:fontRef>
+        </p:style>
+      </p:cxnSp>
+      <p:sp>
+        <p:nvSpPr>
+          <p:cNvPr id="13" name="Rectangle 12"/>
+          <p:cNvSpPr/>
+          <p:nvPr/>
+        </p:nvSpPr>
+        <p:spPr>
+          <a:xfrm>
+            <a:off x="3209332" y="1969694"/>
+            <a:ext cx="1511419" cy="400110"/>
+          </a:xfrm>
+          <a:prstGeom prst="rect">
+            <a:avLst/>
+          </a:prstGeom>
+        </p:spPr>
+        <p:txBody>
+          <a:bodyPr wrap="square">
+            <a:spAutoFit/>
+          </a:bodyPr>
+          <a:lstStyle/>
+          <a:p>
+            <a:pPr algn="ctr"/>
+            <a:r>
+              <a:rPr lang="en-US" sz="2000" b="1" dirty="0" smtClean="0"/>
+              <a:t>Algorithm</a:t>
+            </a:r>
+            <a:endParaRPr lang="en-US" sz="2000" b="1" dirty="0"/>
+          </a:p>
+        </p:txBody>
+      </p:sp>
+      <p:cxnSp>
+        <p:nvCxnSpPr>
+          <p:cNvPr id="14" name="Straight Arrow Connector 13"/>
+          <p:cNvCxnSpPr/>
+          <p:nvPr/>
+        </p:nvCxnSpPr>
+        <p:spPr>
+          <a:xfrm flipV="1">
+            <a:off x="7071515" y="1737659"/>
+            <a:ext cx="2339754" cy="1101076"/>
+          </a:xfrm>
+          <a:prstGeom prst="straightConnector1">
+            <a:avLst/>
+          </a:prstGeom>
+          <a:ln w="76200">
+            <a:tailEnd type="triangle"/>
+          </a:ln>
+        </p:spPr>
+        <p:style>
+          <a:lnRef idx="1">
+            <a:schemeClr val="accent1"/>
+          </a:lnRef>
+          <a:fillRef idx="0">
+            <a:schemeClr val="accent1"/>
+          </a:fillRef>
+          <a:effectRef idx="0">
+            <a:schemeClr val="accent1"/>
+          </a:effectRef>
+          <a:fontRef idx="minor">
+            <a:schemeClr val="tx1"/>
+          </a:fontRef>
+        </p:style>
+      </p:cxnSp>
+      <p:cxnSp>
+        <p:nvCxnSpPr>
+          <p:cNvPr id="26" name="Straight Arrow Connector 25"/>
+          <p:cNvCxnSpPr>
+            <a:stCxn id="4" idx="2"/>
+            <a:endCxn id="8" idx="1"/>
+          </p:cNvCxnSpPr>
+          <p:nvPr/>
+        </p:nvCxnSpPr>
+        <p:spPr>
+          <a:xfrm flipH="1">
+            <a:off x="1096225" y="3539781"/>
+            <a:ext cx="4460388" cy="1096141"/>
+          </a:xfrm>
+          <a:prstGeom prst="straightConnector1">
+            <a:avLst/>
+          </a:prstGeom>
+          <a:ln w="76200">
+            <a:tailEnd type="triangle"/>
+          </a:ln>
+        </p:spPr>
+        <p:style>
+          <a:lnRef idx="1">
+            <a:schemeClr val="accent1"/>
+          </a:lnRef>
+          <a:fillRef idx="0">
+            <a:schemeClr val="accent1"/>
+          </a:fillRef>
+          <a:effectRef idx="0">
+            <a:schemeClr val="accent1"/>
+          </a:effectRef>
+          <a:fontRef idx="minor">
+            <a:schemeClr val="tx1"/>
+          </a:fontRef>
+        </p:style>
+      </p:cxnSp>
+      <p:cxnSp>
+        <p:nvCxnSpPr>
+          <p:cNvPr id="28" name="Straight Arrow Connector 27"/>
+          <p:cNvCxnSpPr>
+            <a:stCxn id="4" idx="3"/>
+            <a:endCxn id="7" idx="2"/>
+          </p:cNvCxnSpPr>
+          <p:nvPr/>
+        </p:nvCxnSpPr>
+        <p:spPr>
+          <a:xfrm>
+            <a:off x="7221339" y="3189258"/>
+            <a:ext cx="1571397" cy="1973916"/>
+          </a:xfrm>
+          <a:prstGeom prst="straightConnector1">
+            <a:avLst/>
+          </a:prstGeom>
+          <a:ln w="76200">
+            <a:tailEnd type="triangle"/>
+          </a:ln>
+        </p:spPr>
+        <p:style>
+          <a:lnRef idx="1">
+            <a:schemeClr val="accent1"/>
+          </a:lnRef>
+          <a:fillRef idx="0">
+            <a:schemeClr val="accent1"/>
+          </a:fillRef>
+          <a:effectRef idx="0">
+            <a:schemeClr val="accent1"/>
+          </a:effectRef>
+          <a:fontRef idx="minor">
+            <a:schemeClr val="tx1"/>
+          </a:fontRef>
+        </p:style>
+      </p:cxnSp>
+      <p:sp>
+        <p:nvSpPr>
+          <p:cNvPr id="30" name="Rectangle 29"/>
+          <p:cNvSpPr/>
+          <p:nvPr/>
+        </p:nvSpPr>
+        <p:spPr>
+          <a:xfrm>
+            <a:off x="5814917" y="1788926"/>
+            <a:ext cx="2977819" cy="707886"/>
+          </a:xfrm>
+          <a:prstGeom prst="rect">
+            <a:avLst/>
+          </a:prstGeom>
+        </p:spPr>
+        <p:txBody>
+          <a:bodyPr wrap="square">
+            <a:spAutoFit/>
+          </a:bodyPr>
+          <a:lstStyle/>
+          <a:p>
+            <a:pPr algn="ctr"/>
+            <a:r>
+              <a:rPr lang="en-US" sz="2000" b="1" dirty="0" smtClean="0"/>
+              <a:t>Programming languages , compiler, and architecture</a:t>
+            </a:r>
+            <a:endParaRPr lang="en-US" sz="2000" b="1" dirty="0"/>
+          </a:p>
+        </p:txBody>
+      </p:sp>
+      <p:sp>
+        <p:nvSpPr>
+          <p:cNvPr id="32" name="Rectangle 31"/>
+          <p:cNvSpPr/>
+          <p:nvPr/>
+        </p:nvSpPr>
+        <p:spPr>
+          <a:xfrm>
+            <a:off x="7303828" y="3300107"/>
+            <a:ext cx="1710814" cy="1015663"/>
+          </a:xfrm>
+          <a:prstGeom prst="rect">
+            <a:avLst/>
+          </a:prstGeom>
+        </p:spPr>
+        <p:txBody>
+          <a:bodyPr wrap="square">
+            <a:spAutoFit/>
+          </a:bodyPr>
+          <a:lstStyle/>
+          <a:p>
+            <a:pPr algn="ctr"/>
+            <a:r>
+              <a:rPr lang="en-US" sz="2000" b="1" dirty="0" smtClean="0"/>
+              <a:t>Processor and memory system</a:t>
+            </a:r>
+            <a:endParaRPr lang="en-US" sz="2000" b="1" dirty="0"/>
+          </a:p>
+        </p:txBody>
+      </p:sp>
+      <p:sp>
+        <p:nvSpPr>
+          <p:cNvPr id="49" name="Rectangle 48"/>
+          <p:cNvSpPr/>
+          <p:nvPr/>
+        </p:nvSpPr>
+        <p:spPr>
+          <a:xfrm>
+            <a:off x="3529028" y="3905974"/>
+            <a:ext cx="1710814" cy="707886"/>
+          </a:xfrm>
+          <a:prstGeom prst="rect">
+            <a:avLst/>
+          </a:prstGeom>
+        </p:spPr>
+        <p:txBody>
+          <a:bodyPr wrap="square">
+            <a:spAutoFit/>
+          </a:bodyPr>
+          <a:lstStyle/>
+          <a:p>
+            <a:pPr algn="ctr"/>
+            <a:r>
+              <a:rPr lang="en-US" sz="2000" b="1" dirty="0" smtClean="0"/>
+              <a:t>I/O system (HW and OS)</a:t>
+            </a:r>
+            <a:endParaRPr lang="en-US" sz="2000" b="1" dirty="0"/>
+          </a:p>
+        </p:txBody>
+      </p:sp>
+    </p:spTree>
+    <p:extLst>
+      <p:ext uri="{BB962C8B-B14F-4D97-AF65-F5344CB8AC3E}">
+        <p14:creationId xmlns:p14="http://schemas.microsoft.com/office/powerpoint/2010/main" val="177473308"/>
+      </p:ext>
+    </p:extLst>
+  </p:cSld>
+  <p:clrMapOvr>
+    <a:masterClrMapping/>
+  </p:clrMapOvr>
+</p:sld>
+</file>
+
 <file path=ppt/theme/theme1.xml><?xml version="1.0" encoding="utf-8"?>
 <a:theme xmlns:a="http://schemas.openxmlformats.org/drawingml/2006/main" name="Office Theme">
   <a:themeElements>

</xml_diff>

<commit_message>
Added future plans slide
</commit_message>
<xml_diff>
--- a/Intro.pptx
+++ b/Intro.pptx
@@ -9,6 +9,7 @@
     <p:sldId id="258" r:id="rId3"/>
     <p:sldId id="259" r:id="rId4"/>
     <p:sldId id="260" r:id="rId5"/>
+    <p:sldId id="261" r:id="rId6"/>
   </p:sldIdLst>
   <p:sldSz cx="12192000" cy="6858000"/>
   <p:notesSz cx="6858000" cy="9144000"/>
@@ -107,6 +108,11 @@
       </a:defRPr>
     </a:lvl9pPr>
   </p:defaultTextStyle>
+  <p:extLst>
+    <p:ext uri="{EFAFB233-063F-42B5-8137-9DF3F51BA10A}">
+      <p15:sldGuideLst xmlns:p15="http://schemas.microsoft.com/office/powerpoint/2012/main"/>
+    </p:ext>
+  </p:extLst>
 </p:presentation>
 </file>
 
@@ -5221,6 +5227,111 @@
 </p:sld>
 </file>
 
+<file path=ppt/slides/slide5.xml><?xml version="1.0" encoding="utf-8"?>
+<p:sld xmlns:a="http://schemas.openxmlformats.org/drawingml/2006/main" xmlns:r="http://schemas.openxmlformats.org/officeDocument/2006/relationships" xmlns:p="http://schemas.openxmlformats.org/presentationml/2006/main">
+  <p:cSld>
+    <p:spTree>
+      <p:nvGrpSpPr>
+        <p:cNvPr id="1" name=""/>
+        <p:cNvGrpSpPr/>
+        <p:nvPr/>
+      </p:nvGrpSpPr>
+      <p:grpSpPr>
+        <a:xfrm>
+          <a:off x="0" y="0"/>
+          <a:ext cx="0" cy="0"/>
+          <a:chOff x="0" y="0"/>
+          <a:chExt cx="0" cy="0"/>
+        </a:xfrm>
+      </p:grpSpPr>
+      <p:sp>
+        <p:nvSpPr>
+          <p:cNvPr id="2" name="Title 1"/>
+          <p:cNvSpPr>
+            <a:spLocks noGrp="1"/>
+          </p:cNvSpPr>
+          <p:nvPr>
+            <p:ph type="title"/>
+          </p:nvPr>
+        </p:nvSpPr>
+        <p:spPr/>
+        <p:txBody>
+          <a:bodyPr/>
+          <a:lstStyle/>
+          <a:p>
+            <a:r>
+              <a:rPr lang="en-US" dirty="0" smtClean="0"/>
+              <a:t>Next plan</a:t>
+            </a:r>
+            <a:endParaRPr lang="en-US" dirty="0"/>
+          </a:p>
+        </p:txBody>
+      </p:sp>
+      <p:sp>
+        <p:nvSpPr>
+          <p:cNvPr id="3" name="Content Placeholder 2"/>
+          <p:cNvSpPr>
+            <a:spLocks noGrp="1"/>
+          </p:cNvSpPr>
+          <p:nvPr>
+            <p:ph idx="1"/>
+          </p:nvPr>
+        </p:nvSpPr>
+        <p:spPr/>
+        <p:txBody>
+          <a:bodyPr/>
+          <a:lstStyle/>
+          <a:p>
+            <a:r>
+              <a:rPr lang="en-US" dirty="0" smtClean="0"/>
+              <a:t>To add </a:t>
+            </a:r>
+            <a:r>
+              <a:rPr lang="en-US" dirty="0" err="1" smtClean="0"/>
+              <a:t>ftos</a:t>
+            </a:r>
+            <a:endParaRPr lang="en-US" dirty="0" smtClean="0"/>
+          </a:p>
+          <a:p>
+            <a:r>
+              <a:rPr lang="en-US" dirty="0" smtClean="0"/>
+              <a:t>Maintains and create new </a:t>
+            </a:r>
+            <a:r>
+              <a:rPr lang="en-US" dirty="0" err="1" smtClean="0"/>
+              <a:t>mindmaps</a:t>
+            </a:r>
+            <a:r>
+              <a:rPr lang="en-US" dirty="0" smtClean="0"/>
+              <a:t>.</a:t>
+            </a:r>
+          </a:p>
+          <a:p>
+            <a:r>
+              <a:rPr lang="en-US" dirty="0" smtClean="0"/>
+              <a:t>Outcome will be the highest grade on </a:t>
+            </a:r>
+            <a:r>
+              <a:rPr lang="en-US" smtClean="0"/>
+              <a:t>this subject</a:t>
+            </a:r>
+            <a:endParaRPr lang="en-US" dirty="0"/>
+          </a:p>
+        </p:txBody>
+      </p:sp>
+    </p:spTree>
+    <p:extLst>
+      <p:ext uri="{BB962C8B-B14F-4D97-AF65-F5344CB8AC3E}">
+        <p14:creationId xmlns:p14="http://schemas.microsoft.com/office/powerpoint/2010/main" val="529533265"/>
+      </p:ext>
+    </p:extLst>
+  </p:cSld>
+  <p:clrMapOvr>
+    <a:masterClrMapping/>
+  </p:clrMapOvr>
+</p:sld>
+</file>
+
 <file path=ppt/theme/theme1.xml><?xml version="1.0" encoding="utf-8"?>
 <a:theme xmlns:a="http://schemas.openxmlformats.org/drawingml/2006/main" name="Office Theme">
   <a:themeElements>

</xml_diff>